<commit_message>
completed prim vs cart powerpoint
</commit_message>
<xml_diff>
--- a/Prim.VS.Cart.pptx
+++ b/Prim.VS.Cart.pptx
@@ -8,6 +8,11 @@
     <p:sldId id="256" r:id="rId2"/>
     <p:sldId id="257" r:id="rId3"/>
     <p:sldId id="258" r:id="rId4"/>
+    <p:sldId id="259" r:id="rId5"/>
+    <p:sldId id="260" r:id="rId6"/>
+    <p:sldId id="262" r:id="rId7"/>
+    <p:sldId id="261" r:id="rId8"/>
+    <p:sldId id="263" r:id="rId9"/>
   </p:sldIdLst>
   <p:sldSz cx="12192000" cy="6858000"/>
   <p:notesSz cx="6858000" cy="9144000"/>
@@ -106,7 +111,226 @@
       </a:defRPr>
     </a:lvl9pPr>
   </p:defaultTextStyle>
+  <p:extLst>
+    <p:ext uri="{EFAFB233-063F-42B5-8137-9DF3F51BA10A}">
+      <p15:sldGuideLst xmlns:p15="http://schemas.microsoft.com/office/powerpoint/2012/main"/>
+    </p:ext>
+  </p:extLst>
 </p:presentation>
+</file>
+
+<file path=ppt/revisionInfo.xml><?xml version="1.0" encoding="utf-8"?>
+<p1510:revInfo xmlns:a="http://schemas.openxmlformats.org/drawingml/2006/main" xmlns:r="http://schemas.openxmlformats.org/officeDocument/2006/relationships" xmlns:p1510="http://schemas.microsoft.com/office/powerpoint/2015/10/main">
+  <p1510:revLst>
+    <p1510:client id="{93FD4C60-3C2E-4260-9711-A3C23E8ECB31}" v="365" dt="2022-02-21T02:03:14.970"/>
+  </p1510:revLst>
+</p1510:revInfo>
+</file>
+
+<file path=ppt/changesInfos/changesInfo1.xml><?xml version="1.0" encoding="utf-8"?>
+<pc:chgInfo xmlns:a="http://schemas.openxmlformats.org/drawingml/2006/main" xmlns:r="http://schemas.openxmlformats.org/officeDocument/2006/relationships" xmlns:ac="http://schemas.microsoft.com/office/drawing/2013/main/command" xmlns:pc="http://schemas.microsoft.com/office/powerpoint/2013/main/command">
+  <pc:docChgLst>
+    <pc:chgData name="Madeline Macmillan" userId="d3c11cb6c53a64f6" providerId="LiveId" clId="{93FD4C60-3C2E-4260-9711-A3C23E8ECB31}"/>
+    <pc:docChg chg="custSel addSld modSld">
+      <pc:chgData name="Madeline Macmillan" userId="d3c11cb6c53a64f6" providerId="LiveId" clId="{93FD4C60-3C2E-4260-9711-A3C23E8ECB31}" dt="2022-02-21T02:13:13.320" v="2324" actId="27636"/>
+      <pc:docMkLst>
+        <pc:docMk/>
+      </pc:docMkLst>
+      <pc:sldChg chg="modSp mod">
+        <pc:chgData name="Madeline Macmillan" userId="d3c11cb6c53a64f6" providerId="LiveId" clId="{93FD4C60-3C2E-4260-9711-A3C23E8ECB31}" dt="2022-02-20T23:34:52.752" v="5" actId="20577"/>
+        <pc:sldMkLst>
+          <pc:docMk/>
+          <pc:sldMk cId="3725040732" sldId="256"/>
+        </pc:sldMkLst>
+        <pc:spChg chg="mod">
+          <ac:chgData name="Madeline Macmillan" userId="d3c11cb6c53a64f6" providerId="LiveId" clId="{93FD4C60-3C2E-4260-9711-A3C23E8ECB31}" dt="2022-02-20T23:34:52.752" v="5" actId="20577"/>
+          <ac:spMkLst>
+            <pc:docMk/>
+            <pc:sldMk cId="3725040732" sldId="256"/>
+            <ac:spMk id="3" creationId="{4BE4FAFA-85C2-4198-B6CE-59FE24DA26F9}"/>
+          </ac:spMkLst>
+        </pc:spChg>
+      </pc:sldChg>
+      <pc:sldChg chg="modSp mod">
+        <pc:chgData name="Madeline Macmillan" userId="d3c11cb6c53a64f6" providerId="LiveId" clId="{93FD4C60-3C2E-4260-9711-A3C23E8ECB31}" dt="2022-02-21T00:09:26.772" v="433" actId="20577"/>
+        <pc:sldMkLst>
+          <pc:docMk/>
+          <pc:sldMk cId="2416244497" sldId="257"/>
+        </pc:sldMkLst>
+        <pc:spChg chg="mod">
+          <ac:chgData name="Madeline Macmillan" userId="d3c11cb6c53a64f6" providerId="LiveId" clId="{93FD4C60-3C2E-4260-9711-A3C23E8ECB31}" dt="2022-02-21T00:09:26.772" v="433" actId="20577"/>
+          <ac:spMkLst>
+            <pc:docMk/>
+            <pc:sldMk cId="2416244497" sldId="257"/>
+            <ac:spMk id="3" creationId="{F689E2AA-DB4F-41E1-B915-3B72710B833D}"/>
+          </ac:spMkLst>
+        </pc:spChg>
+      </pc:sldChg>
+      <pc:sldChg chg="modSp mod">
+        <pc:chgData name="Madeline Macmillan" userId="d3c11cb6c53a64f6" providerId="LiveId" clId="{93FD4C60-3C2E-4260-9711-A3C23E8ECB31}" dt="2022-02-21T01:57:25.781" v="939" actId="21"/>
+        <pc:sldMkLst>
+          <pc:docMk/>
+          <pc:sldMk cId="2698337441" sldId="258"/>
+        </pc:sldMkLst>
+        <pc:spChg chg="mod">
+          <ac:chgData name="Madeline Macmillan" userId="d3c11cb6c53a64f6" providerId="LiveId" clId="{93FD4C60-3C2E-4260-9711-A3C23E8ECB31}" dt="2022-02-21T00:02:33.570" v="99" actId="20577"/>
+          <ac:spMkLst>
+            <pc:docMk/>
+            <pc:sldMk cId="2698337441" sldId="258"/>
+            <ac:spMk id="2" creationId="{E657DDFD-BCFB-4869-BF68-99552F3B7808}"/>
+          </ac:spMkLst>
+        </pc:spChg>
+        <pc:spChg chg="mod">
+          <ac:chgData name="Madeline Macmillan" userId="d3c11cb6c53a64f6" providerId="LiveId" clId="{93FD4C60-3C2E-4260-9711-A3C23E8ECB31}" dt="2022-02-21T01:57:25.781" v="939" actId="21"/>
+          <ac:spMkLst>
+            <pc:docMk/>
+            <pc:sldMk cId="2698337441" sldId="258"/>
+            <ac:spMk id="3" creationId="{BD112A96-506E-4E05-8DC1-52378C8E166A}"/>
+          </ac:spMkLst>
+        </pc:spChg>
+      </pc:sldChg>
+      <pc:sldChg chg="modSp new mod">
+        <pc:chgData name="Madeline Macmillan" userId="d3c11cb6c53a64f6" providerId="LiveId" clId="{93FD4C60-3C2E-4260-9711-A3C23E8ECB31}" dt="2022-02-21T01:47:18.458" v="818" actId="20577"/>
+        <pc:sldMkLst>
+          <pc:docMk/>
+          <pc:sldMk cId="2309941048" sldId="259"/>
+        </pc:sldMkLst>
+        <pc:spChg chg="mod">
+          <ac:chgData name="Madeline Macmillan" userId="d3c11cb6c53a64f6" providerId="LiveId" clId="{93FD4C60-3C2E-4260-9711-A3C23E8ECB31}" dt="2022-02-21T00:02:44.705" v="138" actId="20577"/>
+          <ac:spMkLst>
+            <pc:docMk/>
+            <pc:sldMk cId="2309941048" sldId="259"/>
+            <ac:spMk id="2" creationId="{5253A25C-188E-4FD6-997C-E1E2C50452C6}"/>
+          </ac:spMkLst>
+        </pc:spChg>
+        <pc:spChg chg="mod">
+          <ac:chgData name="Madeline Macmillan" userId="d3c11cb6c53a64f6" providerId="LiveId" clId="{93FD4C60-3C2E-4260-9711-A3C23E8ECB31}" dt="2022-02-21T01:47:18.458" v="818" actId="20577"/>
+          <ac:spMkLst>
+            <pc:docMk/>
+            <pc:sldMk cId="2309941048" sldId="259"/>
+            <ac:spMk id="3" creationId="{88407A9B-901E-44A9-8EEA-19F2C5A3C1BC}"/>
+          </ac:spMkLst>
+        </pc:spChg>
+      </pc:sldChg>
+      <pc:sldChg chg="addSp delSp modSp new mod setBg">
+        <pc:chgData name="Madeline Macmillan" userId="d3c11cb6c53a64f6" providerId="LiveId" clId="{93FD4C60-3C2E-4260-9711-A3C23E8ECB31}" dt="2022-02-21T01:17:49.023" v="664" actId="403"/>
+        <pc:sldMkLst>
+          <pc:docMk/>
+          <pc:sldMk cId="2111701670" sldId="260"/>
+        </pc:sldMkLst>
+        <pc:spChg chg="mod">
+          <ac:chgData name="Madeline Macmillan" userId="d3c11cb6c53a64f6" providerId="LiveId" clId="{93FD4C60-3C2E-4260-9711-A3C23E8ECB31}" dt="2022-02-21T01:17:30.439" v="640" actId="26606"/>
+          <ac:spMkLst>
+            <pc:docMk/>
+            <pc:sldMk cId="2111701670" sldId="260"/>
+            <ac:spMk id="2" creationId="{AC8BD3F3-5F53-4A8B-99BC-E25848424A9B}"/>
+          </ac:spMkLst>
+        </pc:spChg>
+        <pc:spChg chg="del">
+          <ac:chgData name="Madeline Macmillan" userId="d3c11cb6c53a64f6" providerId="LiveId" clId="{93FD4C60-3C2E-4260-9711-A3C23E8ECB31}" dt="2022-02-21T01:17:27.288" v="639"/>
+          <ac:spMkLst>
+            <pc:docMk/>
+            <pc:sldMk cId="2111701670" sldId="260"/>
+            <ac:spMk id="3" creationId="{2109AAFA-4135-4FF3-95CF-AEB705DBD20A}"/>
+          </ac:spMkLst>
+        </pc:spChg>
+        <pc:spChg chg="add">
+          <ac:chgData name="Madeline Macmillan" userId="d3c11cb6c53a64f6" providerId="LiveId" clId="{93FD4C60-3C2E-4260-9711-A3C23E8ECB31}" dt="2022-02-21T01:17:30.439" v="640" actId="26606"/>
+          <ac:spMkLst>
+            <pc:docMk/>
+            <pc:sldMk cId="2111701670" sldId="260"/>
+            <ac:spMk id="73" creationId="{1A95671B-3CC6-4792-9114-B74FAEA224E6}"/>
+          </ac:spMkLst>
+        </pc:spChg>
+        <pc:spChg chg="add mod">
+          <ac:chgData name="Madeline Macmillan" userId="d3c11cb6c53a64f6" providerId="LiveId" clId="{93FD4C60-3C2E-4260-9711-A3C23E8ECB31}" dt="2022-02-21T01:17:49.023" v="664" actId="403"/>
+          <ac:spMkLst>
+            <pc:docMk/>
+            <pc:sldMk cId="2111701670" sldId="260"/>
+            <ac:spMk id="1030" creationId="{1B75C9E2-FD7B-4B68-9959-A67C87863512}"/>
+          </ac:spMkLst>
+        </pc:spChg>
+        <pc:picChg chg="add mod">
+          <ac:chgData name="Madeline Macmillan" userId="d3c11cb6c53a64f6" providerId="LiveId" clId="{93FD4C60-3C2E-4260-9711-A3C23E8ECB31}" dt="2022-02-21T01:17:31.991" v="642" actId="962"/>
+          <ac:picMkLst>
+            <pc:docMk/>
+            <pc:sldMk cId="2111701670" sldId="260"/>
+            <ac:picMk id="1026" creationId="{9BCD7E1F-ECFF-4CA3-8471-3A9BB54D6740}"/>
+          </ac:picMkLst>
+        </pc:picChg>
+      </pc:sldChg>
+      <pc:sldChg chg="modSp new mod">
+        <pc:chgData name="Madeline Macmillan" userId="d3c11cb6c53a64f6" providerId="LiveId" clId="{93FD4C60-3C2E-4260-9711-A3C23E8ECB31}" dt="2022-02-21T02:13:13.320" v="2324" actId="27636"/>
+        <pc:sldMkLst>
+          <pc:docMk/>
+          <pc:sldMk cId="1379775412" sldId="261"/>
+        </pc:sldMkLst>
+        <pc:spChg chg="mod">
+          <ac:chgData name="Madeline Macmillan" userId="d3c11cb6c53a64f6" providerId="LiveId" clId="{93FD4C60-3C2E-4260-9711-A3C23E8ECB31}" dt="2022-02-21T02:12:11.218" v="2164" actId="20577"/>
+          <ac:spMkLst>
+            <pc:docMk/>
+            <pc:sldMk cId="1379775412" sldId="261"/>
+            <ac:spMk id="2" creationId="{D334E57E-F368-47C0-A57C-AD66922404FD}"/>
+          </ac:spMkLst>
+        </pc:spChg>
+        <pc:spChg chg="mod">
+          <ac:chgData name="Madeline Macmillan" userId="d3c11cb6c53a64f6" providerId="LiveId" clId="{93FD4C60-3C2E-4260-9711-A3C23E8ECB31}" dt="2022-02-21T02:13:13.320" v="2324" actId="27636"/>
+          <ac:spMkLst>
+            <pc:docMk/>
+            <pc:sldMk cId="1379775412" sldId="261"/>
+            <ac:spMk id="3" creationId="{754033B7-CA11-4CD3-8EF8-A02FB80DF1AA}"/>
+          </ac:spMkLst>
+        </pc:spChg>
+      </pc:sldChg>
+      <pc:sldChg chg="modSp new mod">
+        <pc:chgData name="Madeline Macmillan" userId="d3c11cb6c53a64f6" providerId="LiveId" clId="{93FD4C60-3C2E-4260-9711-A3C23E8ECB31}" dt="2022-02-21T02:03:14.969" v="1546" actId="20577"/>
+        <pc:sldMkLst>
+          <pc:docMk/>
+          <pc:sldMk cId="2553753028" sldId="262"/>
+        </pc:sldMkLst>
+        <pc:spChg chg="mod">
+          <ac:chgData name="Madeline Macmillan" userId="d3c11cb6c53a64f6" providerId="LiveId" clId="{93FD4C60-3C2E-4260-9711-A3C23E8ECB31}" dt="2022-02-21T01:57:49.471" v="996" actId="20577"/>
+          <ac:spMkLst>
+            <pc:docMk/>
+            <pc:sldMk cId="2553753028" sldId="262"/>
+            <ac:spMk id="2" creationId="{D53AF1C0-A0B6-4CAE-8F4A-9989EF1039C9}"/>
+          </ac:spMkLst>
+        </pc:spChg>
+        <pc:spChg chg="mod">
+          <ac:chgData name="Madeline Macmillan" userId="d3c11cb6c53a64f6" providerId="LiveId" clId="{93FD4C60-3C2E-4260-9711-A3C23E8ECB31}" dt="2022-02-21T02:03:14.969" v="1546" actId="20577"/>
+          <ac:spMkLst>
+            <pc:docMk/>
+            <pc:sldMk cId="2553753028" sldId="262"/>
+            <ac:spMk id="3" creationId="{8E9F0DEF-B985-458C-B0FE-4D0DD8DF7CDF}"/>
+          </ac:spMkLst>
+        </pc:spChg>
+      </pc:sldChg>
+      <pc:sldChg chg="modSp new mod">
+        <pc:chgData name="Madeline Macmillan" userId="d3c11cb6c53a64f6" providerId="LiveId" clId="{93FD4C60-3C2E-4260-9711-A3C23E8ECB31}" dt="2022-02-21T02:11:15.788" v="1963" actId="20577"/>
+        <pc:sldMkLst>
+          <pc:docMk/>
+          <pc:sldMk cId="4252994944" sldId="263"/>
+        </pc:sldMkLst>
+        <pc:spChg chg="mod">
+          <ac:chgData name="Madeline Macmillan" userId="d3c11cb6c53a64f6" providerId="LiveId" clId="{93FD4C60-3C2E-4260-9711-A3C23E8ECB31}" dt="2022-02-21T02:10:08.979" v="1951" actId="20577"/>
+          <ac:spMkLst>
+            <pc:docMk/>
+            <pc:sldMk cId="4252994944" sldId="263"/>
+            <ac:spMk id="2" creationId="{8B2A59E3-44E6-4B81-8F45-918801B3BF44}"/>
+          </ac:spMkLst>
+        </pc:spChg>
+        <pc:spChg chg="mod">
+          <ac:chgData name="Madeline Macmillan" userId="d3c11cb6c53a64f6" providerId="LiveId" clId="{93FD4C60-3C2E-4260-9711-A3C23E8ECB31}" dt="2022-02-21T02:11:15.788" v="1963" actId="20577"/>
+          <ac:spMkLst>
+            <pc:docMk/>
+            <pc:sldMk cId="4252994944" sldId="263"/>
+            <ac:spMk id="3" creationId="{E20612BC-8D5A-496D-A8F2-48E6AA3AE237}"/>
+          </ac:spMkLst>
+        </pc:spChg>
+      </pc:sldChg>
+    </pc:docChg>
+  </pc:docChgLst>
+</pc:chgInfo>
 </file>
 
 <file path=ppt/slideLayouts/slideLayout1.xml><?xml version="1.0" encoding="utf-8"?>
@@ -256,7 +480,7 @@
           <a:p>
             <a:fld id="{3BB163F9-FE5C-461D-B5E4-8083C5506487}" type="datetimeFigureOut">
               <a:rPr lang="en-US" smtClean="0"/>
-              <a:t>2/19/2022</a:t>
+              <a:t>2/20/2022</a:t>
             </a:fld>
             <a:endParaRPr lang="en-US"/>
           </a:p>
@@ -454,7 +678,7 @@
           <a:p>
             <a:fld id="{3BB163F9-FE5C-461D-B5E4-8083C5506487}" type="datetimeFigureOut">
               <a:rPr lang="en-US" smtClean="0"/>
-              <a:t>2/19/2022</a:t>
+              <a:t>2/20/2022</a:t>
             </a:fld>
             <a:endParaRPr lang="en-US"/>
           </a:p>
@@ -662,7 +886,7 @@
           <a:p>
             <a:fld id="{3BB163F9-FE5C-461D-B5E4-8083C5506487}" type="datetimeFigureOut">
               <a:rPr lang="en-US" smtClean="0"/>
-              <a:t>2/19/2022</a:t>
+              <a:t>2/20/2022</a:t>
             </a:fld>
             <a:endParaRPr lang="en-US"/>
           </a:p>
@@ -860,7 +1084,7 @@
           <a:p>
             <a:fld id="{3BB163F9-FE5C-461D-B5E4-8083C5506487}" type="datetimeFigureOut">
               <a:rPr lang="en-US" smtClean="0"/>
-              <a:t>2/19/2022</a:t>
+              <a:t>2/20/2022</a:t>
             </a:fld>
             <a:endParaRPr lang="en-US"/>
           </a:p>
@@ -1135,7 +1359,7 @@
           <a:p>
             <a:fld id="{3BB163F9-FE5C-461D-B5E4-8083C5506487}" type="datetimeFigureOut">
               <a:rPr lang="en-US" smtClean="0"/>
-              <a:t>2/19/2022</a:t>
+              <a:t>2/20/2022</a:t>
             </a:fld>
             <a:endParaRPr lang="en-US"/>
           </a:p>
@@ -1400,7 +1624,7 @@
           <a:p>
             <a:fld id="{3BB163F9-FE5C-461D-B5E4-8083C5506487}" type="datetimeFigureOut">
               <a:rPr lang="en-US" smtClean="0"/>
-              <a:t>2/19/2022</a:t>
+              <a:t>2/20/2022</a:t>
             </a:fld>
             <a:endParaRPr lang="en-US"/>
           </a:p>
@@ -1812,7 +2036,7 @@
           <a:p>
             <a:fld id="{3BB163F9-FE5C-461D-B5E4-8083C5506487}" type="datetimeFigureOut">
               <a:rPr lang="en-US" smtClean="0"/>
-              <a:t>2/19/2022</a:t>
+              <a:t>2/20/2022</a:t>
             </a:fld>
             <a:endParaRPr lang="en-US"/>
           </a:p>
@@ -1953,7 +2177,7 @@
           <a:p>
             <a:fld id="{3BB163F9-FE5C-461D-B5E4-8083C5506487}" type="datetimeFigureOut">
               <a:rPr lang="en-US" smtClean="0"/>
-              <a:t>2/19/2022</a:t>
+              <a:t>2/20/2022</a:t>
             </a:fld>
             <a:endParaRPr lang="en-US"/>
           </a:p>
@@ -2066,7 +2290,7 @@
           <a:p>
             <a:fld id="{3BB163F9-FE5C-461D-B5E4-8083C5506487}" type="datetimeFigureOut">
               <a:rPr lang="en-US" smtClean="0"/>
-              <a:t>2/19/2022</a:t>
+              <a:t>2/20/2022</a:t>
             </a:fld>
             <a:endParaRPr lang="en-US"/>
           </a:p>
@@ -2377,7 +2601,7 @@
           <a:p>
             <a:fld id="{3BB163F9-FE5C-461D-B5E4-8083C5506487}" type="datetimeFigureOut">
               <a:rPr lang="en-US" smtClean="0"/>
-              <a:t>2/19/2022</a:t>
+              <a:t>2/20/2022</a:t>
             </a:fld>
             <a:endParaRPr lang="en-US"/>
           </a:p>
@@ -2665,7 +2889,7 @@
           <a:p>
             <a:fld id="{3BB163F9-FE5C-461D-B5E4-8083C5506487}" type="datetimeFigureOut">
               <a:rPr lang="en-US" smtClean="0"/>
-              <a:t>2/19/2022</a:t>
+              <a:t>2/20/2022</a:t>
             </a:fld>
             <a:endParaRPr lang="en-US"/>
           </a:p>
@@ -2906,7 +3130,7 @@
           <a:p>
             <a:fld id="{3BB163F9-FE5C-461D-B5E4-8083C5506487}" type="datetimeFigureOut">
               <a:rPr lang="en-US" smtClean="0"/>
-              <a:t>2/19/2022</a:t>
+              <a:t>2/20/2022</a:t>
             </a:fld>
             <a:endParaRPr lang="en-US"/>
           </a:p>
@@ -3372,7 +3596,7 @@
           <a:bodyPr/>
           <a:lstStyle/>
           <a:p>
-            <a:endParaRPr lang="en-US"/>
+            <a:endParaRPr lang="en-US" dirty="0"/>
           </a:p>
         </p:txBody>
       </p:sp>
@@ -3452,7 +3676,9 @@
         </p:nvSpPr>
         <p:spPr/>
         <p:txBody>
-          <a:bodyPr/>
+          <a:bodyPr>
+            <a:normAutofit lnSpcReduction="10000"/>
+          </a:bodyPr>
           <a:lstStyle/>
           <a:p>
             <a:r>
@@ -3477,10 +3703,15 @@
           <a:p>
             <a:pPr lvl="1"/>
             <a:r>
-              <a:rPr lang="en-US"/>
+              <a:rPr lang="en-US" dirty="0"/>
               <a:t>Output: Y</a:t>
             </a:r>
-            <a:endParaRPr lang="en-US" dirty="0"/>
+          </a:p>
+          <a:p>
+            <a:r>
+              <a:rPr lang="en-US" dirty="0"/>
+              <a:t>Subgroup discovery algorithm</a:t>
+            </a:r>
           </a:p>
           <a:p>
             <a:r>
@@ -3508,6 +3739,12 @@
               <a:rPr lang="en-US" dirty="0"/>
               <a:t>Ideal for identifying subgroups of patients that respond or don’t respond to certain treatments</a:t>
             </a:r>
+          </a:p>
+          <a:p>
+            <a:pPr marL="0" indent="0">
+              <a:buNone/>
+            </a:pPr>
+            <a:endParaRPr lang="en-US" dirty="0"/>
           </a:p>
         </p:txBody>
       </p:sp>
@@ -3564,7 +3801,7 @@
           <a:p>
             <a:r>
               <a:rPr lang="en-US" dirty="0"/>
-              <a:t>PRIM</a:t>
+              <a:t>PRIM: Patient Rule Induction Method</a:t>
             </a:r>
           </a:p>
         </p:txBody>
@@ -3592,7 +3829,7 @@
           <a:p>
             <a:r>
               <a:rPr lang="en-US" dirty="0"/>
-              <a:t>Sub-group discovery algorithm</a:t>
+              <a:t>Goal: Identify a box (B) in input space that results in the mean of the output variable being larger than that of the population</a:t>
             </a:r>
           </a:p>
           <a:p>
@@ -3606,6 +3843,24 @@
               <a:rPr lang="en-US" dirty="0"/>
               <a:t>Gradually “zooms in” to regions with y values of interest</a:t>
             </a:r>
+          </a:p>
+          <a:p>
+            <a:r>
+              <a:rPr lang="en-US" dirty="0"/>
+              <a:t>When assessing B, each variable is considered in isolation</a:t>
+            </a:r>
+          </a:p>
+          <a:p>
+            <a:r>
+              <a:rPr lang="en-US" dirty="0"/>
+              <a:t>Removes observations until a user-specified minimum, ideally ending in a high support and high mean subgroup</a:t>
+            </a:r>
+          </a:p>
+          <a:p>
+            <a:endParaRPr lang="en-US" dirty="0"/>
+          </a:p>
+          <a:p>
+            <a:endParaRPr lang="en-US" dirty="0"/>
           </a:p>
           <a:p>
             <a:endParaRPr lang="en-US" dirty="0"/>
@@ -3616,6 +3871,974 @@
     <p:extLst>
       <p:ext uri="{BB962C8B-B14F-4D97-AF65-F5344CB8AC3E}">
         <p14:creationId xmlns:p14="http://schemas.microsoft.com/office/powerpoint/2010/main" val="2698337441"/>
+      </p:ext>
+    </p:extLst>
+  </p:cSld>
+  <p:clrMapOvr>
+    <a:masterClrMapping/>
+  </p:clrMapOvr>
+</p:sld>
+</file>
+
+<file path=ppt/slides/slide4.xml><?xml version="1.0" encoding="utf-8"?>
+<p:sld xmlns:a="http://schemas.openxmlformats.org/drawingml/2006/main" xmlns:r="http://schemas.openxmlformats.org/officeDocument/2006/relationships" xmlns:p="http://schemas.openxmlformats.org/presentationml/2006/main">
+  <p:cSld>
+    <p:spTree>
+      <p:nvGrpSpPr>
+        <p:cNvPr id="1" name=""/>
+        <p:cNvGrpSpPr/>
+        <p:nvPr/>
+      </p:nvGrpSpPr>
+      <p:grpSpPr>
+        <a:xfrm>
+          <a:off x="0" y="0"/>
+          <a:ext cx="0" cy="0"/>
+          <a:chOff x="0" y="0"/>
+          <a:chExt cx="0" cy="0"/>
+        </a:xfrm>
+      </p:grpSpPr>
+      <p:sp>
+        <p:nvSpPr>
+          <p:cNvPr id="2" name="Title 1">
+            <a:extLst>
+              <a:ext uri="{FF2B5EF4-FFF2-40B4-BE49-F238E27FC236}">
+                <a16:creationId xmlns:a16="http://schemas.microsoft.com/office/drawing/2014/main" id="{5253A25C-188E-4FD6-997C-E1E2C50452C6}"/>
+              </a:ext>
+            </a:extLst>
+          </p:cNvPr>
+          <p:cNvSpPr>
+            <a:spLocks noGrp="1"/>
+          </p:cNvSpPr>
+          <p:nvPr>
+            <p:ph type="title"/>
+          </p:nvPr>
+        </p:nvSpPr>
+        <p:spPr/>
+        <p:txBody>
+          <a:bodyPr/>
+          <a:lstStyle/>
+          <a:p>
+            <a:r>
+              <a:rPr lang="en-US" dirty="0"/>
+              <a:t>CART: Classification and Regression Trees</a:t>
+            </a:r>
+          </a:p>
+        </p:txBody>
+      </p:sp>
+      <p:sp>
+        <p:nvSpPr>
+          <p:cNvPr id="3" name="Content Placeholder 2">
+            <a:extLst>
+              <a:ext uri="{FF2B5EF4-FFF2-40B4-BE49-F238E27FC236}">
+                <a16:creationId xmlns:a16="http://schemas.microsoft.com/office/drawing/2014/main" id="{88407A9B-901E-44A9-8EEA-19F2C5A3C1BC}"/>
+              </a:ext>
+            </a:extLst>
+          </p:cNvPr>
+          <p:cNvSpPr>
+            <a:spLocks noGrp="1"/>
+          </p:cNvSpPr>
+          <p:nvPr>
+            <p:ph idx="1"/>
+          </p:nvPr>
+        </p:nvSpPr>
+        <p:spPr/>
+        <p:txBody>
+          <a:bodyPr/>
+          <a:lstStyle/>
+          <a:p>
+            <a:r>
+              <a:rPr lang="en-US" dirty="0"/>
+              <a:t>Goal: Identify a set of partitions in input space that results in the mean of the output variable being at least twice than that of the population</a:t>
+            </a:r>
+          </a:p>
+          <a:p>
+            <a:r>
+              <a:rPr lang="en-US" dirty="0"/>
+              <a:t>Does not regard the minimum size of resulting groups</a:t>
+            </a:r>
+          </a:p>
+          <a:p>
+            <a:r>
+              <a:rPr lang="en-US" dirty="0"/>
+              <a:t>Requires less user interaction</a:t>
+            </a:r>
+          </a:p>
+        </p:txBody>
+      </p:sp>
+    </p:spTree>
+    <p:extLst>
+      <p:ext uri="{BB962C8B-B14F-4D97-AF65-F5344CB8AC3E}">
+        <p14:creationId xmlns:p14="http://schemas.microsoft.com/office/powerpoint/2010/main" val="2309941048"/>
+      </p:ext>
+    </p:extLst>
+  </p:cSld>
+  <p:clrMapOvr>
+    <a:masterClrMapping/>
+  </p:clrMapOvr>
+</p:sld>
+</file>
+
+<file path=ppt/slides/slide5.xml><?xml version="1.0" encoding="utf-8"?>
+<p:sld xmlns:a="http://schemas.openxmlformats.org/drawingml/2006/main" xmlns:r="http://schemas.openxmlformats.org/officeDocument/2006/relationships" xmlns:p="http://schemas.openxmlformats.org/presentationml/2006/main">
+  <p:cSld>
+    <p:bg>
+      <p:bgPr>
+        <a:solidFill>
+          <a:schemeClr val="bg1"/>
+        </a:solidFill>
+        <a:effectLst/>
+      </p:bgPr>
+    </p:bg>
+    <p:spTree>
+      <p:nvGrpSpPr>
+        <p:cNvPr id="1" name=""/>
+        <p:cNvGrpSpPr/>
+        <p:nvPr/>
+      </p:nvGrpSpPr>
+      <p:grpSpPr>
+        <a:xfrm>
+          <a:off x="0" y="0"/>
+          <a:ext cx="0" cy="0"/>
+          <a:chOff x="0" y="0"/>
+          <a:chExt cx="0" cy="0"/>
+        </a:xfrm>
+      </p:grpSpPr>
+      <p:sp useBgFill="1">
+        <p:nvSpPr>
+          <p:cNvPr id="73" name="Rectangle 72">
+            <a:extLst>
+              <a:ext uri="{FF2B5EF4-FFF2-40B4-BE49-F238E27FC236}">
+                <a16:creationId xmlns:a16="http://schemas.microsoft.com/office/drawing/2014/main" id="{1A95671B-3CC6-4792-9114-B74FAEA224E6}"/>
+              </a:ext>
+              <a:ext uri="{C183D7F6-B498-43B3-948B-1728B52AA6E4}">
+                <adec:decorative xmlns:adec="http://schemas.microsoft.com/office/drawing/2017/decorative" val="1"/>
+              </a:ext>
+            </a:extLst>
+          </p:cNvPr>
+          <p:cNvSpPr>
+            <a:spLocks noGrp="1" noRot="1" noChangeAspect="1" noMove="1" noResize="1" noEditPoints="1" noAdjustHandles="1" noChangeArrowheads="1" noChangeShapeType="1" noTextEdit="1"/>
+          </p:cNvSpPr>
+          <p:nvPr>
+            <p:extLst>
+              <p:ext uri="{386F3935-93C4-4BCD-93E2-E3B085C9AB24}">
+                <p16:designElem xmlns:p16="http://schemas.microsoft.com/office/powerpoint/2015/main" val="1"/>
+              </p:ext>
+            </p:extLst>
+          </p:nvPr>
+        </p:nvSpPr>
+        <p:spPr>
+          <a:xfrm>
+            <a:off x="0" y="0"/>
+            <a:ext cx="12188952" cy="6858000"/>
+          </a:xfrm>
+          <a:prstGeom prst="rect">
+            <a:avLst/>
+          </a:prstGeom>
+          <a:ln>
+            <a:noFill/>
+          </a:ln>
+        </p:spPr>
+        <p:style>
+          <a:lnRef idx="2">
+            <a:schemeClr val="accent1">
+              <a:shade val="50000"/>
+            </a:schemeClr>
+          </a:lnRef>
+          <a:fillRef idx="1">
+            <a:schemeClr val="accent1"/>
+          </a:fillRef>
+          <a:effectRef idx="0">
+            <a:schemeClr val="accent1"/>
+          </a:effectRef>
+          <a:fontRef idx="minor">
+            <a:schemeClr val="lt1"/>
+          </a:fontRef>
+        </p:style>
+        <p:txBody>
+          <a:bodyPr rtlCol="0" anchor="ctr"/>
+          <a:lstStyle/>
+          <a:p>
+            <a:pPr algn="ctr"/>
+            <a:endParaRPr lang="en-US"/>
+          </a:p>
+        </p:txBody>
+      </p:sp>
+      <p:sp>
+        <p:nvSpPr>
+          <p:cNvPr id="2" name="Title 1">
+            <a:extLst>
+              <a:ext uri="{FF2B5EF4-FFF2-40B4-BE49-F238E27FC236}">
+                <a16:creationId xmlns:a16="http://schemas.microsoft.com/office/drawing/2014/main" id="{AC8BD3F3-5F53-4A8B-99BC-E25848424A9B}"/>
+              </a:ext>
+            </a:extLst>
+          </p:cNvPr>
+          <p:cNvSpPr>
+            <a:spLocks noGrp="1"/>
+          </p:cNvSpPr>
+          <p:nvPr>
+            <p:ph type="title"/>
+          </p:nvPr>
+        </p:nvSpPr>
+        <p:spPr>
+          <a:xfrm>
+            <a:off x="1008184" y="174032"/>
+            <a:ext cx="10175631" cy="1111843"/>
+          </a:xfrm>
+        </p:spPr>
+        <p:txBody>
+          <a:bodyPr anchor="ctr">
+            <a:normAutofit/>
+          </a:bodyPr>
+          <a:lstStyle/>
+          <a:p>
+            <a:pPr algn="ctr"/>
+            <a:r>
+              <a:rPr lang="en-US" sz="4000" dirty="0"/>
+              <a:t>Visualization</a:t>
+            </a:r>
+          </a:p>
+        </p:txBody>
+      </p:sp>
+      <p:sp>
+        <p:nvSpPr>
+          <p:cNvPr id="1030" name="Content Placeholder 1029">
+            <a:extLst>
+              <a:ext uri="{FF2B5EF4-FFF2-40B4-BE49-F238E27FC236}">
+                <a16:creationId xmlns:a16="http://schemas.microsoft.com/office/drawing/2014/main" id="{1B75C9E2-FD7B-4B68-9959-A67C87863512}"/>
+              </a:ext>
+            </a:extLst>
+          </p:cNvPr>
+          <p:cNvSpPr>
+            <a:spLocks noGrp="1"/>
+          </p:cNvSpPr>
+          <p:nvPr>
+            <p:ph idx="1"/>
+          </p:nvPr>
+        </p:nvSpPr>
+        <p:spPr>
+          <a:xfrm>
+            <a:off x="1008184" y="1459907"/>
+            <a:ext cx="10175630" cy="767904"/>
+          </a:xfrm>
+        </p:spPr>
+        <p:txBody>
+          <a:bodyPr anchor="ctr">
+            <a:normAutofit/>
+          </a:bodyPr>
+          <a:lstStyle/>
+          <a:p>
+            <a:pPr marL="0" indent="0" algn="ctr">
+              <a:buNone/>
+            </a:pPr>
+            <a:r>
+              <a:rPr lang="en-US" sz="3600" dirty="0"/>
+              <a:t>PRIM vs. CART</a:t>
+            </a:r>
+          </a:p>
+        </p:txBody>
+      </p:sp>
+      <p:pic>
+        <p:nvPicPr>
+          <p:cNvPr id="1026" name="Picture 2" descr="Diagram&#10;&#10;Description automatically generated">
+            <a:extLst>
+              <a:ext uri="{FF2B5EF4-FFF2-40B4-BE49-F238E27FC236}">
+                <a16:creationId xmlns:a16="http://schemas.microsoft.com/office/drawing/2014/main" id="{9BCD7E1F-ECFF-4CA3-8471-3A9BB54D6740}"/>
+              </a:ext>
+            </a:extLst>
+          </p:cNvPr>
+          <p:cNvPicPr>
+            <a:picLocks noChangeAspect="1" noChangeArrowheads="1"/>
+          </p:cNvPicPr>
+          <p:nvPr/>
+        </p:nvPicPr>
+        <p:blipFill>
+          <a:blip r:embed="rId2">
+            <a:extLst>
+              <a:ext uri="{28A0092B-C50C-407E-A947-70E740481C1C}">
+                <a14:useLocalDpi xmlns:a14="http://schemas.microsoft.com/office/drawing/2010/main" val="0"/>
+              </a:ext>
+            </a:extLst>
+          </a:blip>
+          <a:stretch>
+            <a:fillRect/>
+          </a:stretch>
+        </p:blipFill>
+        <p:spPr bwMode="auto">
+          <a:xfrm>
+            <a:off x="835154" y="2422605"/>
+            <a:ext cx="10515595" cy="3864480"/>
+          </a:xfrm>
+          <a:prstGeom prst="rect">
+            <a:avLst/>
+          </a:prstGeom>
+          <a:noFill/>
+          <a:extLst>
+            <a:ext uri="{909E8E84-426E-40DD-AFC4-6F175D3DCCD1}">
+              <a14:hiddenFill xmlns:a14="http://schemas.microsoft.com/office/drawing/2010/main">
+                <a:solidFill>
+                  <a:srgbClr val="FFFFFF"/>
+                </a:solidFill>
+              </a14:hiddenFill>
+            </a:ext>
+          </a:extLst>
+        </p:spPr>
+      </p:pic>
+    </p:spTree>
+    <p:extLst>
+      <p:ext uri="{BB962C8B-B14F-4D97-AF65-F5344CB8AC3E}">
+        <p14:creationId xmlns:p14="http://schemas.microsoft.com/office/powerpoint/2010/main" val="2111701670"/>
+      </p:ext>
+    </p:extLst>
+  </p:cSld>
+  <p:clrMapOvr>
+    <a:masterClrMapping/>
+  </p:clrMapOvr>
+</p:sld>
+</file>
+
+<file path=ppt/slides/slide6.xml><?xml version="1.0" encoding="utf-8"?>
+<p:sld xmlns:a="http://schemas.openxmlformats.org/drawingml/2006/main" xmlns:r="http://schemas.openxmlformats.org/officeDocument/2006/relationships" xmlns:p="http://schemas.openxmlformats.org/presentationml/2006/main">
+  <p:cSld>
+    <p:spTree>
+      <p:nvGrpSpPr>
+        <p:cNvPr id="1" name=""/>
+        <p:cNvGrpSpPr/>
+        <p:nvPr/>
+      </p:nvGrpSpPr>
+      <p:grpSpPr>
+        <a:xfrm>
+          <a:off x="0" y="0"/>
+          <a:ext cx="0" cy="0"/>
+          <a:chOff x="0" y="0"/>
+          <a:chExt cx="0" cy="0"/>
+        </a:xfrm>
+      </p:grpSpPr>
+      <p:sp>
+        <p:nvSpPr>
+          <p:cNvPr id="2" name="Title 1">
+            <a:extLst>
+              <a:ext uri="{FF2B5EF4-FFF2-40B4-BE49-F238E27FC236}">
+                <a16:creationId xmlns:a16="http://schemas.microsoft.com/office/drawing/2014/main" id="{D53AF1C0-A0B6-4CAE-8F4A-9989EF1039C9}"/>
+              </a:ext>
+            </a:extLst>
+          </p:cNvPr>
+          <p:cNvSpPr>
+            <a:spLocks noGrp="1"/>
+          </p:cNvSpPr>
+          <p:nvPr>
+            <p:ph type="title"/>
+          </p:nvPr>
+        </p:nvSpPr>
+        <p:spPr/>
+        <p:txBody>
+          <a:bodyPr/>
+          <a:lstStyle/>
+          <a:p>
+            <a:r>
+              <a:rPr lang="en-US" dirty="0"/>
+              <a:t>Metrics of Success</a:t>
+            </a:r>
+          </a:p>
+        </p:txBody>
+      </p:sp>
+      <mc:AlternateContent xmlns:mc="http://schemas.openxmlformats.org/markup-compatibility/2006" xmlns:a14="http://schemas.microsoft.com/office/drawing/2010/main">
+        <mc:Choice Requires="a14">
+          <p:sp>
+            <p:nvSpPr>
+              <p:cNvPr id="3" name="Content Placeholder 2">
+                <a:extLst>
+                  <a:ext uri="{FF2B5EF4-FFF2-40B4-BE49-F238E27FC236}">
+                    <a16:creationId xmlns:a16="http://schemas.microsoft.com/office/drawing/2014/main" id="{8E9F0DEF-B985-458C-B0FE-4D0DD8DF7CDF}"/>
+                  </a:ext>
+                </a:extLst>
+              </p:cNvPr>
+              <p:cNvSpPr>
+                <a:spLocks noGrp="1"/>
+              </p:cNvSpPr>
+              <p:nvPr>
+                <p:ph idx="1"/>
+              </p:nvPr>
+            </p:nvSpPr>
+            <p:spPr/>
+            <p:txBody>
+              <a:bodyPr/>
+              <a:lstStyle/>
+              <a:p>
+                <a:r>
+                  <a:rPr lang="en-US" dirty="0"/>
+                  <a:t>Coverage ratio: </a:t>
+                </a:r>
+                <a14:m>
+                  <m:oMath xmlns:m="http://schemas.openxmlformats.org/officeDocument/2006/math">
+                    <m:r>
+                      <m:rPr>
+                        <m:sty m:val="p"/>
+                      </m:rPr>
+                      <a:rPr lang="en-US" b="0" i="0" smtClean="0">
+                        <a:latin typeface="Cambria Math" panose="02040503050406030204" pitchFamily="18" charset="0"/>
+                      </a:rPr>
+                      <m:t>CR</m:t>
+                    </m:r>
+                    <m:r>
+                      <a:rPr lang="en-US" b="0" i="0" smtClean="0">
+                        <a:latin typeface="Cambria Math" panose="02040503050406030204" pitchFamily="18" charset="0"/>
+                      </a:rPr>
+                      <m:t>=</m:t>
+                    </m:r>
+                    <m:f>
+                      <m:fPr>
+                        <m:ctrlPr>
+                          <a:rPr lang="en-US" b="0" i="1" smtClean="0">
+                            <a:latin typeface="Cambria Math" panose="02040503050406030204" pitchFamily="18" charset="0"/>
+                          </a:rPr>
+                        </m:ctrlPr>
+                      </m:fPr>
+                      <m:num>
+                        <m:sSub>
+                          <m:sSubPr>
+                            <m:ctrlPr>
+                              <a:rPr lang="en-US" b="0" i="1" smtClean="0">
+                                <a:latin typeface="Cambria Math" panose="02040503050406030204" pitchFamily="18" charset="0"/>
+                              </a:rPr>
+                            </m:ctrlPr>
+                          </m:sSubPr>
+                          <m:e>
+                            <m:r>
+                              <m:rPr>
+                                <m:sty m:val="p"/>
+                              </m:rPr>
+                              <a:rPr lang="en-US" b="0" i="0" smtClean="0">
+                                <a:latin typeface="Cambria Math" panose="02040503050406030204" pitchFamily="18" charset="0"/>
+                              </a:rPr>
+                              <m:t>C</m:t>
+                            </m:r>
+                          </m:e>
+                          <m:sub>
+                            <m:r>
+                              <m:rPr>
+                                <m:sty m:val="p"/>
+                              </m:rPr>
+                              <a:rPr lang="en-US" b="0" i="0" smtClean="0">
+                                <a:latin typeface="Cambria Math" panose="02040503050406030204" pitchFamily="18" charset="0"/>
+                              </a:rPr>
+                              <m:t>PRIM</m:t>
+                            </m:r>
+                          </m:sub>
+                        </m:sSub>
+                      </m:num>
+                      <m:den>
+                        <m:sSub>
+                          <m:sSubPr>
+                            <m:ctrlPr>
+                              <a:rPr lang="en-US" b="0" i="1" smtClean="0">
+                                <a:latin typeface="Cambria Math" panose="02040503050406030204" pitchFamily="18" charset="0"/>
+                              </a:rPr>
+                            </m:ctrlPr>
+                          </m:sSubPr>
+                          <m:e>
+                            <m:r>
+                              <m:rPr>
+                                <m:sty m:val="p"/>
+                              </m:rPr>
+                              <a:rPr lang="en-US" b="0" i="0" smtClean="0">
+                                <a:latin typeface="Cambria Math" panose="02040503050406030204" pitchFamily="18" charset="0"/>
+                              </a:rPr>
+                              <m:t>C</m:t>
+                            </m:r>
+                          </m:e>
+                          <m:sub>
+                            <m:r>
+                              <m:rPr>
+                                <m:sty m:val="p"/>
+                              </m:rPr>
+                              <a:rPr lang="en-US" b="0" i="0" smtClean="0">
+                                <a:latin typeface="Cambria Math" panose="02040503050406030204" pitchFamily="18" charset="0"/>
+                              </a:rPr>
+                              <m:t>CART</m:t>
+                            </m:r>
+                          </m:sub>
+                        </m:sSub>
+                      </m:den>
+                    </m:f>
+                  </m:oMath>
+                </a14:m>
+                <a:r>
+                  <a:rPr lang="en-US" dirty="0"/>
+                  <a:t>, CR&gt;1 better performance for PRIM, where the coverage is equivalent to the sum of the difference of the B and global means for all subgroups multiplied by the subgroup support</a:t>
+                </a:r>
+              </a:p>
+              <a:p>
+                <a:r>
+                  <a:rPr lang="en-US" dirty="0"/>
+                  <a:t>Relative odds ratio: meaningful for binary outcomes, focuses on the target mean, ROR&gt;1 means better performance for PRIM</a:t>
+                </a:r>
+              </a:p>
+            </p:txBody>
+          </p:sp>
+        </mc:Choice>
+        <mc:Fallback xmlns="">
+          <p:sp>
+            <p:nvSpPr>
+              <p:cNvPr id="3" name="Content Placeholder 2">
+                <a:extLst>
+                  <a:ext uri="{FF2B5EF4-FFF2-40B4-BE49-F238E27FC236}">
+                    <a16:creationId xmlns:a16="http://schemas.microsoft.com/office/drawing/2014/main" id="{8E9F0DEF-B985-458C-B0FE-4D0DD8DF7CDF}"/>
+                  </a:ext>
+                </a:extLst>
+              </p:cNvPr>
+              <p:cNvSpPr>
+                <a:spLocks noGrp="1" noRot="1" noChangeAspect="1" noMove="1" noResize="1" noEditPoints="1" noAdjustHandles="1" noChangeArrowheads="1" noChangeShapeType="1" noTextEdit="1"/>
+              </p:cNvSpPr>
+              <p:nvPr>
+                <p:ph idx="1"/>
+              </p:nvPr>
+            </p:nvSpPr>
+            <p:spPr>
+              <a:blipFill>
+                <a:blip r:embed="rId2"/>
+                <a:stretch>
+                  <a:fillRect l="-1043" t="-140" r="-1739"/>
+                </a:stretch>
+              </a:blipFill>
+            </p:spPr>
+            <p:txBody>
+              <a:bodyPr/>
+              <a:lstStyle/>
+              <a:p>
+                <a:r>
+                  <a:rPr lang="en-US">
+                    <a:noFill/>
+                  </a:rPr>
+                  <a:t> </a:t>
+                </a:r>
+              </a:p>
+            </p:txBody>
+          </p:sp>
+        </mc:Fallback>
+      </mc:AlternateContent>
+    </p:spTree>
+    <p:extLst>
+      <p:ext uri="{BB962C8B-B14F-4D97-AF65-F5344CB8AC3E}">
+        <p14:creationId xmlns:p14="http://schemas.microsoft.com/office/powerpoint/2010/main" val="2553753028"/>
+      </p:ext>
+    </p:extLst>
+  </p:cSld>
+  <p:clrMapOvr>
+    <a:masterClrMapping/>
+  </p:clrMapOvr>
+</p:sld>
+</file>
+
+<file path=ppt/slides/slide7.xml><?xml version="1.0" encoding="utf-8"?>
+<p:sld xmlns:a="http://schemas.openxmlformats.org/drawingml/2006/main" xmlns:r="http://schemas.openxmlformats.org/officeDocument/2006/relationships" xmlns:p="http://schemas.openxmlformats.org/presentationml/2006/main">
+  <p:cSld>
+    <p:spTree>
+      <p:nvGrpSpPr>
+        <p:cNvPr id="1" name=""/>
+        <p:cNvGrpSpPr/>
+        <p:nvPr/>
+      </p:nvGrpSpPr>
+      <p:grpSpPr>
+        <a:xfrm>
+          <a:off x="0" y="0"/>
+          <a:ext cx="0" cy="0"/>
+          <a:chOff x="0" y="0"/>
+          <a:chExt cx="0" cy="0"/>
+        </a:xfrm>
+      </p:grpSpPr>
+      <p:sp>
+        <p:nvSpPr>
+          <p:cNvPr id="2" name="Title 1">
+            <a:extLst>
+              <a:ext uri="{FF2B5EF4-FFF2-40B4-BE49-F238E27FC236}">
+                <a16:creationId xmlns:a16="http://schemas.microsoft.com/office/drawing/2014/main" id="{D334E57E-F368-47C0-A57C-AD66922404FD}"/>
+              </a:ext>
+            </a:extLst>
+          </p:cNvPr>
+          <p:cNvSpPr>
+            <a:spLocks noGrp="1"/>
+          </p:cNvSpPr>
+          <p:nvPr>
+            <p:ph type="title"/>
+          </p:nvPr>
+        </p:nvSpPr>
+        <p:spPr/>
+        <p:txBody>
+          <a:bodyPr/>
+          <a:lstStyle/>
+          <a:p>
+            <a:r>
+              <a:rPr lang="en-US" dirty="0"/>
+              <a:t>Discussion</a:t>
+            </a:r>
+          </a:p>
+        </p:txBody>
+      </p:sp>
+      <p:sp>
+        <p:nvSpPr>
+          <p:cNvPr id="3" name="Content Placeholder 2">
+            <a:extLst>
+              <a:ext uri="{FF2B5EF4-FFF2-40B4-BE49-F238E27FC236}">
+                <a16:creationId xmlns:a16="http://schemas.microsoft.com/office/drawing/2014/main" id="{754033B7-CA11-4CD3-8EF8-A02FB80DF1AA}"/>
+              </a:ext>
+            </a:extLst>
+          </p:cNvPr>
+          <p:cNvSpPr>
+            <a:spLocks noGrp="1"/>
+          </p:cNvSpPr>
+          <p:nvPr>
+            <p:ph idx="1"/>
+          </p:nvPr>
+        </p:nvSpPr>
+        <p:spPr/>
+        <p:txBody>
+          <a:bodyPr>
+            <a:normAutofit fontScale="92500" lnSpcReduction="10000"/>
+          </a:bodyPr>
+          <a:lstStyle/>
+          <a:p>
+            <a:r>
+              <a:rPr lang="en-US" dirty="0"/>
+              <a:t>In an example, when seeking the single best subgroup, PRIM failed to find a large subgroup with ordinal variables and CART had superior performance based on the metrics of success</a:t>
+            </a:r>
+          </a:p>
+          <a:p>
+            <a:r>
+              <a:rPr lang="en-US" dirty="0"/>
+              <a:t>Another paper found that PRIM can be superior in complex situations (few observations, multiple subgroups) and is </a:t>
+            </a:r>
+            <a:r>
+              <a:rPr lang="en-US"/>
+              <a:t>more flexible </a:t>
+            </a:r>
+          </a:p>
+          <a:p>
+            <a:r>
+              <a:rPr lang="en-US"/>
+              <a:t>If </a:t>
+            </a:r>
+            <a:r>
+              <a:rPr lang="en-US" dirty="0"/>
+              <a:t>using PRIM:</a:t>
+            </a:r>
+          </a:p>
+          <a:p>
+            <a:pPr lvl="1"/>
+            <a:r>
+              <a:rPr lang="en-US" dirty="0"/>
+              <a:t>Make accommodations for ordinal variables</a:t>
+            </a:r>
+          </a:p>
+          <a:p>
+            <a:pPr lvl="1"/>
+            <a:r>
+              <a:rPr lang="en-US" dirty="0"/>
+              <a:t>Improve trade-off between number of peeled observations and the subsequent increase in quality of the subgroup</a:t>
+            </a:r>
+          </a:p>
+          <a:p>
+            <a:pPr lvl="1"/>
+            <a:r>
+              <a:rPr lang="en-US" dirty="0"/>
+              <a:t>Extend search for alternatives with a beam search</a:t>
+            </a:r>
+          </a:p>
+          <a:p>
+            <a:pPr lvl="1"/>
+            <a:r>
+              <a:rPr lang="en-US" dirty="0"/>
+              <a:t>F-PRIM?</a:t>
+            </a:r>
+          </a:p>
+          <a:p>
+            <a:pPr lvl="1"/>
+            <a:r>
+              <a:rPr lang="en-US" dirty="0"/>
+              <a:t>All additional steps do increase the complexity of search process and algorithm time</a:t>
+            </a:r>
+          </a:p>
+          <a:p>
+            <a:endParaRPr lang="en-US" dirty="0"/>
+          </a:p>
+        </p:txBody>
+      </p:sp>
+    </p:spTree>
+    <p:extLst>
+      <p:ext uri="{BB962C8B-B14F-4D97-AF65-F5344CB8AC3E}">
+        <p14:creationId xmlns:p14="http://schemas.microsoft.com/office/powerpoint/2010/main" val="1379775412"/>
+      </p:ext>
+    </p:extLst>
+  </p:cSld>
+  <p:clrMapOvr>
+    <a:masterClrMapping/>
+  </p:clrMapOvr>
+</p:sld>
+</file>
+
+<file path=ppt/slides/slide8.xml><?xml version="1.0" encoding="utf-8"?>
+<p:sld xmlns:a="http://schemas.openxmlformats.org/drawingml/2006/main" xmlns:r="http://schemas.openxmlformats.org/officeDocument/2006/relationships" xmlns:p="http://schemas.openxmlformats.org/presentationml/2006/main">
+  <p:cSld>
+    <p:spTree>
+      <p:nvGrpSpPr>
+        <p:cNvPr id="1" name=""/>
+        <p:cNvGrpSpPr/>
+        <p:nvPr/>
+      </p:nvGrpSpPr>
+      <p:grpSpPr>
+        <a:xfrm>
+          <a:off x="0" y="0"/>
+          <a:ext cx="0" cy="0"/>
+          <a:chOff x="0" y="0"/>
+          <a:chExt cx="0" cy="0"/>
+        </a:xfrm>
+      </p:grpSpPr>
+      <p:sp>
+        <p:nvSpPr>
+          <p:cNvPr id="2" name="Title 1">
+            <a:extLst>
+              <a:ext uri="{FF2B5EF4-FFF2-40B4-BE49-F238E27FC236}">
+                <a16:creationId xmlns:a16="http://schemas.microsoft.com/office/drawing/2014/main" id="{8B2A59E3-44E6-4B81-8F45-918801B3BF44}"/>
+              </a:ext>
+            </a:extLst>
+          </p:cNvPr>
+          <p:cNvSpPr>
+            <a:spLocks noGrp="1"/>
+          </p:cNvSpPr>
+          <p:nvPr>
+            <p:ph type="title"/>
+          </p:nvPr>
+        </p:nvSpPr>
+        <p:spPr/>
+        <p:txBody>
+          <a:bodyPr/>
+          <a:lstStyle/>
+          <a:p>
+            <a:r>
+              <a:rPr lang="en-US" dirty="0"/>
+              <a:t>References</a:t>
+            </a:r>
+          </a:p>
+        </p:txBody>
+      </p:sp>
+      <p:sp>
+        <p:nvSpPr>
+          <p:cNvPr id="3" name="Content Placeholder 2">
+            <a:extLst>
+              <a:ext uri="{FF2B5EF4-FFF2-40B4-BE49-F238E27FC236}">
+                <a16:creationId xmlns:a16="http://schemas.microsoft.com/office/drawing/2014/main" id="{E20612BC-8D5A-496D-A8F2-48E6AA3AE237}"/>
+              </a:ext>
+            </a:extLst>
+          </p:cNvPr>
+          <p:cNvSpPr>
+            <a:spLocks noGrp="1"/>
+          </p:cNvSpPr>
+          <p:nvPr>
+            <p:ph idx="1"/>
+          </p:nvPr>
+        </p:nvSpPr>
+        <p:spPr/>
+        <p:txBody>
+          <a:bodyPr/>
+          <a:lstStyle/>
+          <a:p>
+            <a:pPr marL="0" marR="0" indent="0">
+              <a:lnSpc>
+                <a:spcPct val="107000"/>
+              </a:lnSpc>
+              <a:spcBef>
+                <a:spcPts val="0"/>
+              </a:spcBef>
+              <a:spcAft>
+                <a:spcPts val="800"/>
+              </a:spcAft>
+              <a:buNone/>
+            </a:pPr>
+            <a:r>
+              <a:rPr lang="en-US" sz="1800" dirty="0">
+                <a:effectLst/>
+                <a:latin typeface="Times New Roman" panose="02020603050405020304" pitchFamily="18" charset="0"/>
+                <a:ea typeface="Calibri" panose="020F0502020204030204" pitchFamily="34" charset="0"/>
+                <a:cs typeface="Times New Roman" panose="02020603050405020304" pitchFamily="18" charset="0"/>
+              </a:rPr>
+              <a:t>[1]	A. Abu-Hanna, B. </a:t>
+            </a:r>
+            <a:r>
+              <a:rPr lang="en-US" sz="1800" dirty="0" err="1">
+                <a:effectLst/>
+                <a:latin typeface="Times New Roman" panose="02020603050405020304" pitchFamily="18" charset="0"/>
+                <a:ea typeface="Calibri" panose="020F0502020204030204" pitchFamily="34" charset="0"/>
+                <a:cs typeface="Times New Roman" panose="02020603050405020304" pitchFamily="18" charset="0"/>
+              </a:rPr>
+              <a:t>Nannings</a:t>
+            </a:r>
+            <a:r>
+              <a:rPr lang="en-US" sz="1800" dirty="0">
+                <a:effectLst/>
+                <a:latin typeface="Times New Roman" panose="02020603050405020304" pitchFamily="18" charset="0"/>
+                <a:ea typeface="Calibri" panose="020F0502020204030204" pitchFamily="34" charset="0"/>
+                <a:cs typeface="Times New Roman" panose="02020603050405020304" pitchFamily="18" charset="0"/>
+              </a:rPr>
+              <a:t>, D. </a:t>
+            </a:r>
+            <a:r>
+              <a:rPr lang="en-US" sz="1800" dirty="0" err="1">
+                <a:effectLst/>
+                <a:latin typeface="Times New Roman" panose="02020603050405020304" pitchFamily="18" charset="0"/>
+                <a:ea typeface="Calibri" panose="020F0502020204030204" pitchFamily="34" charset="0"/>
+                <a:cs typeface="Times New Roman" panose="02020603050405020304" pitchFamily="18" charset="0"/>
+              </a:rPr>
+              <a:t>Dongelmans</a:t>
+            </a:r>
+            <a:r>
+              <a:rPr lang="en-US" sz="1800" dirty="0">
+                <a:effectLst/>
+                <a:latin typeface="Times New Roman" panose="02020603050405020304" pitchFamily="18" charset="0"/>
+                <a:ea typeface="Calibri" panose="020F0502020204030204" pitchFamily="34" charset="0"/>
+                <a:cs typeface="Times New Roman" panose="02020603050405020304" pitchFamily="18" charset="0"/>
+              </a:rPr>
+              <a:t>, and A. </a:t>
+            </a:r>
+            <a:r>
+              <a:rPr lang="en-US" sz="1800" dirty="0" err="1">
+                <a:effectLst/>
+                <a:latin typeface="Times New Roman" panose="02020603050405020304" pitchFamily="18" charset="0"/>
+                <a:ea typeface="Calibri" panose="020F0502020204030204" pitchFamily="34" charset="0"/>
+                <a:cs typeface="Times New Roman" panose="02020603050405020304" pitchFamily="18" charset="0"/>
+              </a:rPr>
+              <a:t>Hasman</a:t>
+            </a:r>
+            <a:r>
+              <a:rPr lang="en-US" sz="1800" dirty="0">
+                <a:effectLst/>
+                <a:latin typeface="Times New Roman" panose="02020603050405020304" pitchFamily="18" charset="0"/>
+                <a:ea typeface="Calibri" panose="020F0502020204030204" pitchFamily="34" charset="0"/>
+                <a:cs typeface="Times New Roman" panose="02020603050405020304" pitchFamily="18" charset="0"/>
+              </a:rPr>
+              <a:t>, “PRIM versus CART in subgroup discovery: When patience is harmful,” </a:t>
+            </a:r>
+            <a:r>
+              <a:rPr lang="en-US" sz="1800" i="1" dirty="0">
+                <a:effectLst/>
+                <a:latin typeface="Times New Roman" panose="02020603050405020304" pitchFamily="18" charset="0"/>
+                <a:ea typeface="Calibri" panose="020F0502020204030204" pitchFamily="34" charset="0"/>
+                <a:cs typeface="Times New Roman" panose="02020603050405020304" pitchFamily="18" charset="0"/>
+              </a:rPr>
+              <a:t>Journal of Biomedical Informatics</a:t>
+            </a:r>
+            <a:r>
+              <a:rPr lang="en-US" sz="1800" dirty="0">
+                <a:effectLst/>
+                <a:latin typeface="Times New Roman" panose="02020603050405020304" pitchFamily="18" charset="0"/>
+                <a:ea typeface="Calibri" panose="020F0502020204030204" pitchFamily="34" charset="0"/>
+                <a:cs typeface="Times New Roman" panose="02020603050405020304" pitchFamily="18" charset="0"/>
+              </a:rPr>
+              <a:t>, vol. 43, no. 5, pp. 701–708, Oct. 2010, </a:t>
+            </a:r>
+            <a:r>
+              <a:rPr lang="en-US" sz="1800" dirty="0" err="1">
+                <a:effectLst/>
+                <a:latin typeface="Times New Roman" panose="02020603050405020304" pitchFamily="18" charset="0"/>
+                <a:ea typeface="Calibri" panose="020F0502020204030204" pitchFamily="34" charset="0"/>
+                <a:cs typeface="Times New Roman" panose="02020603050405020304" pitchFamily="18" charset="0"/>
+              </a:rPr>
+              <a:t>doi</a:t>
+            </a:r>
+            <a:r>
+              <a:rPr lang="en-US" sz="1800" dirty="0">
+                <a:effectLst/>
+                <a:latin typeface="Times New Roman" panose="02020603050405020304" pitchFamily="18" charset="0"/>
+                <a:ea typeface="Calibri" panose="020F0502020204030204" pitchFamily="34" charset="0"/>
+                <a:cs typeface="Times New Roman" panose="02020603050405020304" pitchFamily="18" charset="0"/>
+              </a:rPr>
+              <a:t>: 10.1016/j.jbi.2010.05.009.</a:t>
+            </a:r>
+          </a:p>
+          <a:p>
+            <a:pPr marL="0" marR="0" indent="0">
+              <a:lnSpc>
+                <a:spcPct val="107000"/>
+              </a:lnSpc>
+              <a:spcBef>
+                <a:spcPts val="0"/>
+              </a:spcBef>
+              <a:spcAft>
+                <a:spcPts val="800"/>
+              </a:spcAft>
+              <a:buNone/>
+            </a:pPr>
+            <a:r>
+              <a:rPr lang="en-US" sz="1800" dirty="0">
+                <a:effectLst/>
+                <a:latin typeface="Times New Roman" panose="02020603050405020304" pitchFamily="18" charset="0"/>
+                <a:ea typeface="Calibri" panose="020F0502020204030204" pitchFamily="34" charset="0"/>
+                <a:cs typeface="Times New Roman" panose="02020603050405020304" pitchFamily="18" charset="0"/>
+              </a:rPr>
+              <a:t>[2]	A. Ott and A. </a:t>
+            </a:r>
+            <a:r>
+              <a:rPr lang="en-US" sz="1800" dirty="0" err="1">
+                <a:effectLst/>
+                <a:latin typeface="Times New Roman" panose="02020603050405020304" pitchFamily="18" charset="0"/>
+                <a:ea typeface="Calibri" panose="020F0502020204030204" pitchFamily="34" charset="0"/>
+                <a:cs typeface="Times New Roman" panose="02020603050405020304" pitchFamily="18" charset="0"/>
+              </a:rPr>
+              <a:t>Hapfelmeier</a:t>
+            </a:r>
+            <a:r>
+              <a:rPr lang="en-US" sz="1800" dirty="0">
+                <a:effectLst/>
+                <a:latin typeface="Times New Roman" panose="02020603050405020304" pitchFamily="18" charset="0"/>
+                <a:ea typeface="Calibri" panose="020F0502020204030204" pitchFamily="34" charset="0"/>
+                <a:cs typeface="Times New Roman" panose="02020603050405020304" pitchFamily="18" charset="0"/>
+              </a:rPr>
+              <a:t>, “Nonparametric Subgroup Identification by PRIM and CART: A Simulation and Application Study,” </a:t>
+            </a:r>
+            <a:r>
+              <a:rPr lang="en-US" sz="1800" i="1" dirty="0">
+                <a:effectLst/>
+                <a:latin typeface="Times New Roman" panose="02020603050405020304" pitchFamily="18" charset="0"/>
+                <a:ea typeface="Calibri" panose="020F0502020204030204" pitchFamily="34" charset="0"/>
+                <a:cs typeface="Times New Roman" panose="02020603050405020304" pitchFamily="18" charset="0"/>
+              </a:rPr>
+              <a:t>Computational and Mathematical Methods in Medicine</a:t>
+            </a:r>
+            <a:r>
+              <a:rPr lang="en-US" sz="1800" dirty="0">
+                <a:effectLst/>
+                <a:latin typeface="Times New Roman" panose="02020603050405020304" pitchFamily="18" charset="0"/>
+                <a:ea typeface="Calibri" panose="020F0502020204030204" pitchFamily="34" charset="0"/>
+                <a:cs typeface="Times New Roman" panose="02020603050405020304" pitchFamily="18" charset="0"/>
+              </a:rPr>
+              <a:t>, vol. 2017, p. e5271091, May 2017, </a:t>
+            </a:r>
+            <a:r>
+              <a:rPr lang="en-US" sz="1800" dirty="0" err="1">
+                <a:effectLst/>
+                <a:latin typeface="Times New Roman" panose="02020603050405020304" pitchFamily="18" charset="0"/>
+                <a:ea typeface="Calibri" panose="020F0502020204030204" pitchFamily="34" charset="0"/>
+                <a:cs typeface="Times New Roman" panose="02020603050405020304" pitchFamily="18" charset="0"/>
+              </a:rPr>
+              <a:t>doi</a:t>
+            </a:r>
+            <a:r>
+              <a:rPr lang="en-US" sz="1800" dirty="0">
+                <a:effectLst/>
+                <a:latin typeface="Times New Roman" panose="02020603050405020304" pitchFamily="18" charset="0"/>
+                <a:ea typeface="Calibri" panose="020F0502020204030204" pitchFamily="34" charset="0"/>
+                <a:cs typeface="Times New Roman" panose="02020603050405020304" pitchFamily="18" charset="0"/>
+              </a:rPr>
+              <a:t>: 10.1155/2017/5271091.</a:t>
+            </a:r>
+          </a:p>
+          <a:p>
+            <a:endParaRPr lang="en-US" dirty="0"/>
+          </a:p>
+        </p:txBody>
+      </p:sp>
+    </p:spTree>
+    <p:extLst>
+      <p:ext uri="{BB962C8B-B14F-4D97-AF65-F5344CB8AC3E}">
+        <p14:creationId xmlns:p14="http://schemas.microsoft.com/office/powerpoint/2010/main" val="4252994944"/>
       </p:ext>
     </p:extLst>
   </p:cSld>

</xml_diff>